<commit_message>
final project and report
</commit_message>
<xml_diff>
--- a/RL_Presentation.pptx
+++ b/RL_Presentation.pptx
@@ -207,7 +207,7 @@
           <a:p>
             <a:fld id="{45D588E4-D476-324F-9E68-EAFB011C8467}" type="datetimeFigureOut">
               <a:rPr lang="en-US" smtClean="0"/>
-              <a:t>4/26/18</a:t>
+              <a:t>4/27/18</a:t>
             </a:fld>
             <a:endParaRPr lang="en-US"/>
           </a:p>
@@ -1157,7 +1157,11 @@
           <a:p>
             <a:r>
               <a:rPr lang="en-US" dirty="0"/>
-              <a:t>Cute: agent keeps trying to buy more coins, but its balance is insufficient</a:t>
+              <a:t>Y-axis </a:t>
+            </a:r>
+            <a:r>
+              <a:rPr lang="en-US"/>
+              <a:t>in dollar</a:t>
             </a:r>
           </a:p>
           <a:p>
@@ -2233,7 +2237,7 @@
             </a:ln>
             <a:extLst>
               <a:ext uri="{91240B29-F687-4f45-9708-019B960494DF}">
-                <a14:hiddenLine xmlns="" xmlns:a14="http://schemas.microsoft.com/office/drawing/2010/main" w="9525">
+                <a14:hiddenLine xmlns:a14="http://schemas.microsoft.com/office/drawing/2010/main" xmlns="" w="9525">
                   <a:solidFill>
                     <a:srgbClr val="000000"/>
                   </a:solidFill>
@@ -2430,7 +2434,7 @@
           <a:p>
             <a:fld id="{FA1B09D7-CEA8-634E-ABEE-6B8737FE71FF}" type="datetimeFigureOut">
               <a:rPr lang="en-US" smtClean="0"/>
-              <a:t>4/26/18</a:t>
+              <a:t>4/27/18</a:t>
             </a:fld>
             <a:endParaRPr lang="en-US"/>
           </a:p>
@@ -3314,7 +3318,7 @@
             </a:ln>
             <a:extLst>
               <a:ext uri="{91240B29-F687-4f45-9708-019B960494DF}">
-                <a14:hiddenLine xmlns="" xmlns:a14="http://schemas.microsoft.com/office/drawing/2010/main" w="9525">
+                <a14:hiddenLine xmlns:a14="http://schemas.microsoft.com/office/drawing/2010/main" xmlns="" w="9525">
                   <a:solidFill>
                     <a:srgbClr val="000000"/>
                   </a:solidFill>
@@ -3531,7 +3535,7 @@
           <a:p>
             <a:fld id="{FA1B09D7-CEA8-634E-ABEE-6B8737FE71FF}" type="datetimeFigureOut">
               <a:rPr lang="en-US" smtClean="0"/>
-              <a:t>4/26/18</a:t>
+              <a:t>4/27/18</a:t>
             </a:fld>
             <a:endParaRPr lang="en-US"/>
           </a:p>
@@ -4400,7 +4404,7 @@
             </a:ln>
             <a:extLst>
               <a:ext uri="{91240B29-F687-4f45-9708-019B960494DF}">
-                <a14:hiddenLine xmlns="" xmlns:a14="http://schemas.microsoft.com/office/drawing/2010/main" w="9525">
+                <a14:hiddenLine xmlns:a14="http://schemas.microsoft.com/office/drawing/2010/main" xmlns="" w="9525">
                   <a:solidFill>
                     <a:srgbClr val="000000"/>
                   </a:solidFill>
@@ -4529,7 +4533,7 @@
           <a:p>
             <a:fld id="{FA1B09D7-CEA8-634E-ABEE-6B8737FE71FF}" type="datetimeFigureOut">
               <a:rPr lang="en-US" smtClean="0"/>
-              <a:t>4/26/18</a:t>
+              <a:t>4/27/18</a:t>
             </a:fld>
             <a:endParaRPr lang="en-US"/>
           </a:p>
@@ -5361,7 +5365,7 @@
             </a:ln>
             <a:extLst>
               <a:ext uri="{91240B29-F687-4f45-9708-019B960494DF}">
-                <a14:hiddenLine xmlns="" xmlns:a14="http://schemas.microsoft.com/office/drawing/2010/main" w="9525">
+                <a14:hiddenLine xmlns:a14="http://schemas.microsoft.com/office/drawing/2010/main" xmlns="" w="9525">
                   <a:solidFill>
                     <a:srgbClr val="000000"/>
                   </a:solidFill>
@@ -5644,7 +5648,7 @@
           <a:p>
             <a:fld id="{FA1B09D7-CEA8-634E-ABEE-6B8737FE71FF}" type="datetimeFigureOut">
               <a:rPr lang="en-US" smtClean="0"/>
-              <a:t>4/26/18</a:t>
+              <a:t>4/27/18</a:t>
             </a:fld>
             <a:endParaRPr lang="en-US"/>
           </a:p>
@@ -6476,7 +6480,7 @@
             </a:ln>
             <a:extLst>
               <a:ext uri="{91240B29-F687-4f45-9708-019B960494DF}">
-                <a14:hiddenLine xmlns="" xmlns:a14="http://schemas.microsoft.com/office/drawing/2010/main" w="9525">
+                <a14:hiddenLine xmlns:a14="http://schemas.microsoft.com/office/drawing/2010/main" xmlns="" w="9525">
                   <a:solidFill>
                     <a:srgbClr val="000000"/>
                   </a:solidFill>
@@ -6658,7 +6662,7 @@
           <a:p>
             <a:fld id="{FA1B09D7-CEA8-634E-ABEE-6B8737FE71FF}" type="datetimeFigureOut">
               <a:rPr lang="en-US" smtClean="0"/>
-              <a:t>4/26/18</a:t>
+              <a:t>4/27/18</a:t>
             </a:fld>
             <a:endParaRPr lang="en-US"/>
           </a:p>
@@ -7330,7 +7334,7 @@
           <a:p>
             <a:fld id="{FA1B09D7-CEA8-634E-ABEE-6B8737FE71FF}" type="datetimeFigureOut">
               <a:rPr lang="en-US" smtClean="0"/>
-              <a:t>4/26/18</a:t>
+              <a:t>4/27/18</a:t>
             </a:fld>
             <a:endParaRPr lang="en-US"/>
           </a:p>
@@ -8203,7 +8207,7 @@
           <a:p>
             <a:fld id="{FA1B09D7-CEA8-634E-ABEE-6B8737FE71FF}" type="datetimeFigureOut">
               <a:rPr lang="en-US" smtClean="0"/>
-              <a:t>4/26/18</a:t>
+              <a:t>4/27/18</a:t>
             </a:fld>
             <a:endParaRPr lang="en-US"/>
           </a:p>
@@ -8385,7 +8389,7 @@
           <a:p>
             <a:fld id="{FA1B09D7-CEA8-634E-ABEE-6B8737FE71FF}" type="datetimeFigureOut">
               <a:rPr lang="en-US" smtClean="0"/>
-              <a:t>4/26/18</a:t>
+              <a:t>4/27/18</a:t>
             </a:fld>
             <a:endParaRPr lang="en-US"/>
           </a:p>
@@ -9215,7 +9219,7 @@
           </a:ln>
           <a:extLst>
             <a:ext uri="{91240B29-F687-4f45-9708-019B960494DF}">
-              <a14:hiddenLine xmlns="" xmlns:a14="http://schemas.microsoft.com/office/drawing/2010/main" w="9525">
+              <a14:hiddenLine xmlns:a14="http://schemas.microsoft.com/office/drawing/2010/main" xmlns="" w="9525">
                 <a:solidFill>
                   <a:srgbClr val="000000"/>
                 </a:solidFill>
@@ -9329,7 +9333,7 @@
           <a:p>
             <a:fld id="{FA1B09D7-CEA8-634E-ABEE-6B8737FE71FF}" type="datetimeFigureOut">
               <a:rPr lang="en-US" smtClean="0"/>
-              <a:t>4/26/18</a:t>
+              <a:t>4/27/18</a:t>
             </a:fld>
             <a:endParaRPr lang="en-US"/>
           </a:p>
@@ -9556,7 +9560,7 @@
           <a:p>
             <a:fld id="{FA1B09D7-CEA8-634E-ABEE-6B8737FE71FF}" type="datetimeFigureOut">
               <a:rPr lang="en-US" smtClean="0"/>
-              <a:t>4/26/18</a:t>
+              <a:t>4/27/18</a:t>
             </a:fld>
             <a:endParaRPr lang="en-US"/>
           </a:p>
@@ -10385,7 +10389,7 @@
             </a:ln>
             <a:extLst>
               <a:ext uri="{91240B29-F687-4f45-9708-019B960494DF}">
-                <a14:hiddenLine xmlns="" xmlns:a14="http://schemas.microsoft.com/office/drawing/2010/main" w="9525">
+                <a14:hiddenLine xmlns:a14="http://schemas.microsoft.com/office/drawing/2010/main" xmlns="" w="9525">
                   <a:solidFill>
                     <a:srgbClr val="000000"/>
                   </a:solidFill>
@@ -10567,7 +10571,7 @@
           <a:p>
             <a:fld id="{FA1B09D7-CEA8-634E-ABEE-6B8737FE71FF}" type="datetimeFigureOut">
               <a:rPr lang="en-US" smtClean="0"/>
-              <a:t>4/26/18</a:t>
+              <a:t>4/27/18</a:t>
             </a:fld>
             <a:endParaRPr lang="en-US"/>
           </a:p>
@@ -10851,7 +10855,7 @@
           <a:p>
             <a:fld id="{FA1B09D7-CEA8-634E-ABEE-6B8737FE71FF}" type="datetimeFigureOut">
               <a:rPr lang="en-US" smtClean="0"/>
-              <a:t>4/26/18</a:t>
+              <a:t>4/27/18</a:t>
             </a:fld>
             <a:endParaRPr lang="en-US"/>
           </a:p>
@@ -11251,7 +11255,7 @@
           <a:p>
             <a:fld id="{FA1B09D7-CEA8-634E-ABEE-6B8737FE71FF}" type="datetimeFigureOut">
               <a:rPr lang="en-US" smtClean="0"/>
-              <a:t>4/26/18</a:t>
+              <a:t>4/27/18</a:t>
             </a:fld>
             <a:endParaRPr lang="en-US"/>
           </a:p>
@@ -11381,7 +11385,7 @@
           <a:p>
             <a:fld id="{FA1B09D7-CEA8-634E-ABEE-6B8737FE71FF}" type="datetimeFigureOut">
               <a:rPr lang="en-US" smtClean="0"/>
-              <a:t>4/26/18</a:t>
+              <a:t>4/27/18</a:t>
             </a:fld>
             <a:endParaRPr lang="en-US"/>
           </a:p>
@@ -11524,7 +11528,7 @@
           <a:p>
             <a:fld id="{FA1B09D7-CEA8-634E-ABEE-6B8737FE71FF}" type="datetimeFigureOut">
               <a:rPr lang="en-US" smtClean="0"/>
-              <a:t>4/26/18</a:t>
+              <a:t>4/27/18</a:t>
             </a:fld>
             <a:endParaRPr lang="en-US"/>
           </a:p>
@@ -12353,7 +12357,7 @@
             </a:ln>
             <a:extLst>
               <a:ext uri="{91240B29-F687-4f45-9708-019B960494DF}">
-                <a14:hiddenLine xmlns="" xmlns:a14="http://schemas.microsoft.com/office/drawing/2010/main" w="9525">
+                <a14:hiddenLine xmlns:a14="http://schemas.microsoft.com/office/drawing/2010/main" xmlns="" w="9525">
                   <a:solidFill>
                     <a:srgbClr val="000000"/>
                   </a:solidFill>
@@ -12546,7 +12550,7 @@
           <a:p>
             <a:fld id="{FA1B09D7-CEA8-634E-ABEE-6B8737FE71FF}" type="datetimeFigureOut">
               <a:rPr lang="en-US" smtClean="0"/>
-              <a:t>4/26/18</a:t>
+              <a:t>4/27/18</a:t>
             </a:fld>
             <a:endParaRPr lang="en-US"/>
           </a:p>
@@ -13411,7 +13415,7 @@
             </a:ln>
             <a:extLst>
               <a:ext uri="{91240B29-F687-4f45-9708-019B960494DF}">
-                <a14:hiddenLine xmlns="" xmlns:a14="http://schemas.microsoft.com/office/drawing/2010/main" w="9525">
+                <a14:hiddenLine xmlns:a14="http://schemas.microsoft.com/office/drawing/2010/main" xmlns="" w="9525">
                   <a:solidFill>
                     <a:srgbClr val="000000"/>
                   </a:solidFill>
@@ -13628,7 +13632,7 @@
           <a:p>
             <a:fld id="{FA1B09D7-CEA8-634E-ABEE-6B8737FE71FF}" type="datetimeFigureOut">
               <a:rPr lang="en-US" smtClean="0"/>
-              <a:t>4/26/18</a:t>
+              <a:t>4/27/18</a:t>
             </a:fld>
             <a:endParaRPr lang="en-US"/>
           </a:p>
@@ -14461,7 +14465,7 @@
             </a:ln>
             <a:extLst>
               <a:ext uri="{91240B29-F687-4f45-9708-019B960494DF}">
-                <a14:hiddenLine xmlns="" xmlns:a14="http://schemas.microsoft.com/office/drawing/2010/main" w="9525">
+                <a14:hiddenLine xmlns:a14="http://schemas.microsoft.com/office/drawing/2010/main" xmlns="" w="9525">
                   <a:solidFill>
                     <a:srgbClr val="000000"/>
                   </a:solidFill>
@@ -14602,7 +14606,7 @@
           <a:p>
             <a:fld id="{FA1B09D7-CEA8-634E-ABEE-6B8737FE71FF}" type="datetimeFigureOut">
               <a:rPr lang="en-US" smtClean="0"/>
-              <a:t>4/26/18</a:t>
+              <a:t>4/27/18</a:t>
             </a:fld>
             <a:endParaRPr lang="en-US"/>
           </a:p>

</xml_diff>